<commit_message>
Here I have started the abstract please add, subtract, or conform
</commit_message>
<xml_diff>
--- a/work/poster.pptx
+++ b/work/poster.pptx
@@ -175,7 +175,7 @@
             <a:srgbClr val="A4A3A4"/>
           </p15:clr>
         </p15:guide>
-        <p15:guide id="8" pos="24535" userDrawn="1">
+        <p15:guide id="8" pos="24536" userDrawn="1">
           <p15:clr>
             <a:srgbClr val="A4A3A4"/>
           </p15:clr>
@@ -190,12 +190,12 @@
             <a:srgbClr val="A4A3A4"/>
           </p15:clr>
         </p15:guide>
-        <p15:guide id="11" pos="23563" userDrawn="1">
+        <p15:guide id="11" pos="23564" userDrawn="1">
           <p15:clr>
             <a:srgbClr val="A4A3A4"/>
           </p15:clr>
         </p15:guide>
-        <p15:guide id="12" pos="30871" userDrawn="1">
+        <p15:guide id="12" pos="30872" userDrawn="1">
           <p15:clr>
             <a:srgbClr val="A4A3A4"/>
           </p15:clr>
@@ -985,7 +985,7 @@
         </p:nvSpPr>
         <p:spPr>
           <a:xfrm>
-            <a:off x="3840165" y="10226675"/>
+            <a:off x="3840166" y="10226675"/>
             <a:ext cx="43526075" cy="7054850"/>
           </a:xfrm>
         </p:spPr>
@@ -1012,8 +1012,8 @@
         </p:nvSpPr>
         <p:spPr>
           <a:xfrm>
-            <a:off x="7680325" y="18653126"/>
-            <a:ext cx="35845750" cy="8413750"/>
+            <a:off x="7680326" y="18653126"/>
+            <a:ext cx="35845749" cy="8413750"/>
           </a:xfrm>
         </p:spPr>
         <p:txBody>
@@ -1023,35 +1023,35 @@
               <a:buNone/>
               <a:defRPr/>
             </a:lvl1pPr>
-            <a:lvl2pPr marL="470276" indent="0" algn="ctr">
+            <a:lvl2pPr marL="470321" indent="0" algn="ctr">
               <a:buNone/>
               <a:defRPr/>
             </a:lvl2pPr>
-            <a:lvl3pPr marL="940552" indent="0" algn="ctr">
+            <a:lvl3pPr marL="940642" indent="0" algn="ctr">
               <a:buNone/>
               <a:defRPr/>
             </a:lvl3pPr>
-            <a:lvl4pPr marL="1410828" indent="0" algn="ctr">
+            <a:lvl4pPr marL="1410962" indent="0" algn="ctr">
               <a:buNone/>
               <a:defRPr/>
             </a:lvl4pPr>
-            <a:lvl5pPr marL="1881104" indent="0" algn="ctr">
+            <a:lvl5pPr marL="1881283" indent="0" algn="ctr">
               <a:buNone/>
               <a:defRPr/>
             </a:lvl5pPr>
-            <a:lvl6pPr marL="2351380" indent="0" algn="ctr">
+            <a:lvl6pPr marL="2351604" indent="0" algn="ctr">
               <a:buNone/>
               <a:defRPr/>
             </a:lvl6pPr>
-            <a:lvl7pPr marL="2821656" indent="0" algn="ctr">
+            <a:lvl7pPr marL="2821925" indent="0" algn="ctr">
               <a:buNone/>
               <a:defRPr/>
             </a:lvl7pPr>
-            <a:lvl8pPr marL="3291931" indent="0" algn="ctr">
+            <a:lvl8pPr marL="3292245" indent="0" algn="ctr">
               <a:buNone/>
               <a:defRPr/>
             </a:lvl8pPr>
-            <a:lvl9pPr marL="3762207" indent="0" algn="ctr">
+            <a:lvl9pPr marL="3762565" indent="0" algn="ctr">
               <a:buNone/>
               <a:defRPr/>
             </a:lvl9pPr>
@@ -1391,7 +1391,7 @@
         </p:nvSpPr>
         <p:spPr>
           <a:xfrm>
-            <a:off x="36485515" y="2925763"/>
+            <a:off x="36485515" y="2925764"/>
             <a:ext cx="10880725" cy="26335037"/>
           </a:xfrm>
         </p:spPr>
@@ -1418,7 +1418,7 @@
         </p:nvSpPr>
         <p:spPr>
           <a:xfrm>
-            <a:off x="3840163" y="2925763"/>
+            <a:off x="3840163" y="2925764"/>
             <a:ext cx="32492950" cy="26335037"/>
           </a:xfrm>
         </p:spPr>
@@ -1789,7 +1789,7 @@
         </p:nvSpPr>
         <p:spPr>
           <a:xfrm>
-            <a:off x="4044952" y="21153439"/>
+            <a:off x="4044953" y="21153439"/>
             <a:ext cx="43526075" cy="6537325"/>
           </a:xfrm>
         </p:spPr>
@@ -1797,7 +1797,7 @@
           <a:bodyPr anchor="t"/>
           <a:lstStyle>
             <a:lvl1pPr algn="l">
-              <a:defRPr sz="4114" b="1" cap="all"/>
+              <a:defRPr sz="4115" b="1" cap="all"/>
             </a:lvl1pPr>
           </a:lstStyle>
           <a:p>
@@ -1820,7 +1820,7 @@
         </p:nvSpPr>
         <p:spPr>
           <a:xfrm>
-            <a:off x="4044952" y="13952539"/>
+            <a:off x="4044953" y="13952539"/>
             <a:ext cx="43526075" cy="7200900"/>
           </a:xfrm>
         </p:spPr>
@@ -1831,35 +1831,35 @@
               <a:buNone/>
               <a:defRPr sz="2057"/>
             </a:lvl1pPr>
-            <a:lvl2pPr marL="470276" indent="0">
+            <a:lvl2pPr marL="470321" indent="0">
               <a:buNone/>
               <a:defRPr sz="1851"/>
             </a:lvl2pPr>
-            <a:lvl3pPr marL="940552" indent="0">
+            <a:lvl3pPr marL="940642" indent="0">
               <a:buNone/>
               <a:defRPr sz="1646"/>
             </a:lvl3pPr>
-            <a:lvl4pPr marL="1410828" indent="0">
+            <a:lvl4pPr marL="1410962" indent="0">
               <a:buNone/>
               <a:defRPr sz="1440"/>
             </a:lvl4pPr>
-            <a:lvl5pPr marL="1881104" indent="0">
+            <a:lvl5pPr marL="1881283" indent="0">
               <a:buNone/>
               <a:defRPr sz="1440"/>
             </a:lvl5pPr>
-            <a:lvl6pPr marL="2351380" indent="0">
+            <a:lvl6pPr marL="2351604" indent="0">
               <a:buNone/>
               <a:defRPr sz="1440"/>
             </a:lvl6pPr>
-            <a:lvl7pPr marL="2821656" indent="0">
+            <a:lvl7pPr marL="2821925" indent="0">
               <a:buNone/>
               <a:defRPr sz="1440"/>
             </a:lvl7pPr>
-            <a:lvl8pPr marL="3291931" indent="0">
+            <a:lvl8pPr marL="3292245" indent="0">
               <a:buNone/>
               <a:defRPr sz="1440"/>
             </a:lvl8pPr>
-            <a:lvl9pPr marL="3762207" indent="0">
+            <a:lvl9pPr marL="3762565" indent="0">
               <a:buNone/>
               <a:defRPr sz="1440"/>
             </a:lvl9pPr>
@@ -2028,7 +2028,7 @@
         </p:nvSpPr>
         <p:spPr>
           <a:xfrm>
-            <a:off x="3840165" y="9510714"/>
+            <a:off x="3840166" y="9510715"/>
             <a:ext cx="21686837" cy="19750087"/>
           </a:xfrm>
         </p:spPr>
@@ -2112,7 +2112,7 @@
         </p:nvSpPr>
         <p:spPr>
           <a:xfrm>
-            <a:off x="25679400" y="9510714"/>
+            <a:off x="25679401" y="9510715"/>
             <a:ext cx="21686838" cy="19750087"/>
           </a:xfrm>
         </p:spPr>
@@ -2317,7 +2317,7 @@
         </p:nvSpPr>
         <p:spPr>
           <a:xfrm>
-            <a:off x="2560640" y="1317625"/>
+            <a:off x="2560641" y="1317625"/>
             <a:ext cx="46085125" cy="5486400"/>
           </a:xfrm>
         </p:spPr>
@@ -2359,35 +2359,35 @@
               <a:buNone/>
               <a:defRPr sz="2469" b="1"/>
             </a:lvl1pPr>
-            <a:lvl2pPr marL="470276" indent="0">
+            <a:lvl2pPr marL="470321" indent="0">
               <a:buNone/>
               <a:defRPr sz="2057" b="1"/>
             </a:lvl2pPr>
-            <a:lvl3pPr marL="940552" indent="0">
+            <a:lvl3pPr marL="940642" indent="0">
               <a:buNone/>
               <a:defRPr sz="1851" b="1"/>
             </a:lvl3pPr>
-            <a:lvl4pPr marL="1410828" indent="0">
+            <a:lvl4pPr marL="1410962" indent="0">
               <a:buNone/>
               <a:defRPr sz="1646" b="1"/>
             </a:lvl4pPr>
-            <a:lvl5pPr marL="1881104" indent="0">
+            <a:lvl5pPr marL="1881283" indent="0">
               <a:buNone/>
               <a:defRPr sz="1646" b="1"/>
             </a:lvl5pPr>
-            <a:lvl6pPr marL="2351380" indent="0">
+            <a:lvl6pPr marL="2351604" indent="0">
               <a:buNone/>
               <a:defRPr sz="1646" b="1"/>
             </a:lvl6pPr>
-            <a:lvl7pPr marL="2821656" indent="0">
+            <a:lvl7pPr marL="2821925" indent="0">
               <a:buNone/>
               <a:defRPr sz="1646" b="1"/>
             </a:lvl7pPr>
-            <a:lvl8pPr marL="3291931" indent="0">
+            <a:lvl8pPr marL="3292245" indent="0">
               <a:buNone/>
               <a:defRPr sz="1646" b="1"/>
             </a:lvl8pPr>
-            <a:lvl9pPr marL="3762207" indent="0">
+            <a:lvl9pPr marL="3762565" indent="0">
               <a:buNone/>
               <a:defRPr sz="1646" b="1"/>
             </a:lvl9pPr>
@@ -2413,7 +2413,7 @@
         </p:nvSpPr>
         <p:spPr>
           <a:xfrm>
-            <a:off x="2560638" y="10439401"/>
+            <a:off x="2560638" y="10439402"/>
             <a:ext cx="22625050" cy="18965863"/>
           </a:xfrm>
         </p:spPr>
@@ -2508,35 +2508,35 @@
               <a:buNone/>
               <a:defRPr sz="2469" b="1"/>
             </a:lvl1pPr>
-            <a:lvl2pPr marL="470276" indent="0">
+            <a:lvl2pPr marL="470321" indent="0">
               <a:buNone/>
               <a:defRPr sz="2057" b="1"/>
             </a:lvl2pPr>
-            <a:lvl3pPr marL="940552" indent="0">
+            <a:lvl3pPr marL="940642" indent="0">
               <a:buNone/>
               <a:defRPr sz="1851" b="1"/>
             </a:lvl3pPr>
-            <a:lvl4pPr marL="1410828" indent="0">
+            <a:lvl4pPr marL="1410962" indent="0">
               <a:buNone/>
               <a:defRPr sz="1646" b="1"/>
             </a:lvl4pPr>
-            <a:lvl5pPr marL="1881104" indent="0">
+            <a:lvl5pPr marL="1881283" indent="0">
               <a:buNone/>
               <a:defRPr sz="1646" b="1"/>
             </a:lvl5pPr>
-            <a:lvl6pPr marL="2351380" indent="0">
+            <a:lvl6pPr marL="2351604" indent="0">
               <a:buNone/>
               <a:defRPr sz="1646" b="1"/>
             </a:lvl6pPr>
-            <a:lvl7pPr marL="2821656" indent="0">
+            <a:lvl7pPr marL="2821925" indent="0">
               <a:buNone/>
               <a:defRPr sz="1646" b="1"/>
             </a:lvl7pPr>
-            <a:lvl8pPr marL="3291931" indent="0">
+            <a:lvl8pPr marL="3292245" indent="0">
               <a:buNone/>
               <a:defRPr sz="1646" b="1"/>
             </a:lvl8pPr>
-            <a:lvl9pPr marL="3762207" indent="0">
+            <a:lvl9pPr marL="3762565" indent="0">
               <a:buNone/>
               <a:defRPr sz="1646" b="1"/>
             </a:lvl9pPr>
@@ -2562,7 +2562,7 @@
         </p:nvSpPr>
         <p:spPr>
           <a:xfrm>
-            <a:off x="26012775" y="10439401"/>
+            <a:off x="26012775" y="10439402"/>
             <a:ext cx="22632988" cy="18965863"/>
           </a:xfrm>
         </p:spPr>
@@ -3062,7 +3062,7 @@
         </p:nvSpPr>
         <p:spPr>
           <a:xfrm>
-            <a:off x="20019963" y="1311276"/>
+            <a:off x="20019963" y="1311277"/>
             <a:ext cx="28625800" cy="28093988"/>
           </a:xfrm>
         </p:spPr>
@@ -3157,35 +3157,35 @@
               <a:buNone/>
               <a:defRPr sz="1440"/>
             </a:lvl1pPr>
-            <a:lvl2pPr marL="470276" indent="0">
+            <a:lvl2pPr marL="470321" indent="0">
               <a:buNone/>
               <a:defRPr sz="1234"/>
             </a:lvl2pPr>
-            <a:lvl3pPr marL="940552" indent="0">
+            <a:lvl3pPr marL="940642" indent="0">
               <a:buNone/>
               <a:defRPr sz="1029"/>
             </a:lvl3pPr>
-            <a:lvl4pPr marL="1410828" indent="0">
+            <a:lvl4pPr marL="1410962" indent="0">
               <a:buNone/>
               <a:defRPr sz="926"/>
             </a:lvl4pPr>
-            <a:lvl5pPr marL="1881104" indent="0">
+            <a:lvl5pPr marL="1881283" indent="0">
               <a:buNone/>
               <a:defRPr sz="926"/>
             </a:lvl5pPr>
-            <a:lvl6pPr marL="2351380" indent="0">
+            <a:lvl6pPr marL="2351604" indent="0">
               <a:buNone/>
               <a:defRPr sz="926"/>
             </a:lvl6pPr>
-            <a:lvl7pPr marL="2821656" indent="0">
+            <a:lvl7pPr marL="2821925" indent="0">
               <a:buNone/>
               <a:defRPr sz="926"/>
             </a:lvl7pPr>
-            <a:lvl8pPr marL="3291931" indent="0">
+            <a:lvl8pPr marL="3292245" indent="0">
               <a:buNone/>
               <a:defRPr sz="926"/>
             </a:lvl8pPr>
-            <a:lvl9pPr marL="3762207" indent="0">
+            <a:lvl9pPr marL="3762565" indent="0">
               <a:buNone/>
               <a:defRPr sz="926"/>
             </a:lvl9pPr>
@@ -3332,7 +3332,7 @@
         </p:nvSpPr>
         <p:spPr>
           <a:xfrm>
-            <a:off x="10036177" y="23042563"/>
+            <a:off x="10036178" y="23042564"/>
             <a:ext cx="30724475" cy="2720975"/>
           </a:xfrm>
         </p:spPr>
@@ -3363,7 +3363,7 @@
         </p:nvSpPr>
         <p:spPr>
           <a:xfrm>
-            <a:off x="10036177" y="2941639"/>
+            <a:off x="10036178" y="2941639"/>
             <a:ext cx="30724475" cy="19750087"/>
           </a:xfrm>
         </p:spPr>
@@ -3374,35 +3374,35 @@
               <a:buNone/>
               <a:defRPr sz="3292"/>
             </a:lvl1pPr>
-            <a:lvl2pPr marL="470276" indent="0">
+            <a:lvl2pPr marL="470321" indent="0">
               <a:buNone/>
               <a:defRPr sz="2880"/>
             </a:lvl2pPr>
-            <a:lvl3pPr marL="940552" indent="0">
+            <a:lvl3pPr marL="940642" indent="0">
               <a:buNone/>
               <a:defRPr sz="2469"/>
             </a:lvl3pPr>
-            <a:lvl4pPr marL="1410828" indent="0">
+            <a:lvl4pPr marL="1410962" indent="0">
               <a:buNone/>
               <a:defRPr sz="2057"/>
             </a:lvl4pPr>
-            <a:lvl5pPr marL="1881104" indent="0">
+            <a:lvl5pPr marL="1881283" indent="0">
               <a:buNone/>
               <a:defRPr sz="2057"/>
             </a:lvl5pPr>
-            <a:lvl6pPr marL="2351380" indent="0">
+            <a:lvl6pPr marL="2351604" indent="0">
               <a:buNone/>
               <a:defRPr sz="2057"/>
             </a:lvl6pPr>
-            <a:lvl7pPr marL="2821656" indent="0">
+            <a:lvl7pPr marL="2821925" indent="0">
               <a:buNone/>
               <a:defRPr sz="2057"/>
             </a:lvl7pPr>
-            <a:lvl8pPr marL="3291931" indent="0">
+            <a:lvl8pPr marL="3292245" indent="0">
               <a:buNone/>
               <a:defRPr sz="2057"/>
             </a:lvl8pPr>
-            <a:lvl9pPr marL="3762207" indent="0">
+            <a:lvl9pPr marL="3762565" indent="0">
               <a:buNone/>
               <a:defRPr sz="2057"/>
             </a:lvl9pPr>
@@ -3425,7 +3425,7 @@
         </p:nvSpPr>
         <p:spPr>
           <a:xfrm>
-            <a:off x="10036177" y="25763539"/>
+            <a:off x="10036178" y="25763540"/>
             <a:ext cx="30724475" cy="3862387"/>
           </a:xfrm>
         </p:spPr>
@@ -3436,35 +3436,35 @@
               <a:buNone/>
               <a:defRPr sz="1440"/>
             </a:lvl1pPr>
-            <a:lvl2pPr marL="470276" indent="0">
+            <a:lvl2pPr marL="470321" indent="0">
               <a:buNone/>
               <a:defRPr sz="1234"/>
             </a:lvl2pPr>
-            <a:lvl3pPr marL="940552" indent="0">
+            <a:lvl3pPr marL="940642" indent="0">
               <a:buNone/>
               <a:defRPr sz="1029"/>
             </a:lvl3pPr>
-            <a:lvl4pPr marL="1410828" indent="0">
+            <a:lvl4pPr marL="1410962" indent="0">
               <a:buNone/>
               <a:defRPr sz="926"/>
             </a:lvl4pPr>
-            <a:lvl5pPr marL="1881104" indent="0">
+            <a:lvl5pPr marL="1881283" indent="0">
               <a:buNone/>
               <a:defRPr sz="926"/>
             </a:lvl5pPr>
-            <a:lvl6pPr marL="2351380" indent="0">
+            <a:lvl6pPr marL="2351604" indent="0">
               <a:buNone/>
               <a:defRPr sz="926"/>
             </a:lvl6pPr>
-            <a:lvl7pPr marL="2821656" indent="0">
+            <a:lvl7pPr marL="2821925" indent="0">
               <a:buNone/>
               <a:defRPr sz="926"/>
             </a:lvl7pPr>
-            <a:lvl8pPr marL="3291931" indent="0">
+            <a:lvl8pPr marL="3292245" indent="0">
               <a:buNone/>
               <a:defRPr sz="926"/>
             </a:lvl8pPr>
-            <a:lvl9pPr marL="3762207" indent="0">
+            <a:lvl9pPr marL="3762565" indent="0">
               <a:buNone/>
               <a:defRPr sz="926"/>
             </a:lvl9pPr>
@@ -3677,7 +3677,7 @@
         </p:nvSpPr>
         <p:spPr bwMode="auto">
           <a:xfrm>
-            <a:off x="3840164" y="9511393"/>
+            <a:off x="3840164" y="9511394"/>
             <a:ext cx="43526075" cy="19749407"/>
           </a:xfrm>
           <a:prstGeom prst="rect">
@@ -3786,7 +3786,7 @@
           </a:bodyPr>
           <a:lstStyle>
             <a:lvl1pPr eaLnBrk="1" hangingPunct="1">
-              <a:defRPr sz="6377">
+              <a:defRPr sz="6378">
                 <a:latin typeface="Times New Roman" charset="0"/>
                 <a:ea typeface="ＭＳ Ｐゴシック" charset="0"/>
                 <a:cs typeface="ＭＳ Ｐゴシック" charset="0"/>
@@ -3836,7 +3836,7 @@
           </a:bodyPr>
           <a:lstStyle>
             <a:lvl1pPr algn="ctr" eaLnBrk="1" hangingPunct="1">
-              <a:defRPr sz="6377">
+              <a:defRPr sz="6378">
                 <a:latin typeface="Times New Roman" charset="0"/>
                 <a:ea typeface="ＭＳ Ｐゴシック" charset="0"/>
                 <a:cs typeface="ＭＳ Ｐゴシック" charset="0"/>
@@ -3863,7 +3863,7 @@
         </p:nvSpPr>
         <p:spPr bwMode="auto">
           <a:xfrm>
-            <a:off x="36698238" y="29992320"/>
+            <a:off x="36698237" y="29992320"/>
             <a:ext cx="10668000" cy="2194560"/>
           </a:xfrm>
           <a:prstGeom prst="rect">
@@ -3886,7 +3886,7 @@
           </a:bodyPr>
           <a:lstStyle>
             <a:lvl1pPr algn="r" eaLnBrk="1" hangingPunct="1">
-              <a:defRPr sz="6377" smtClean="0">
+              <a:defRPr sz="6378" smtClean="0">
                 <a:latin typeface="Times New Roman" panose="02020603050405020304" pitchFamily="18" charset="0"/>
               </a:defRPr>
             </a:lvl1pPr>
@@ -3924,14 +3924,14 @@
   </p:sldLayoutIdLst>
   <p:txStyles>
     <p:titleStyle>
-      <a:lvl1pPr algn="ctr" defTabSz="4191661" rtl="0" eaLnBrk="0" fontAlgn="base" hangingPunct="0">
+      <a:lvl1pPr algn="ctr" defTabSz="4192060" rtl="0" eaLnBrk="0" fontAlgn="base" hangingPunct="0">
         <a:spcBef>
           <a:spcPct val="0"/>
         </a:spcBef>
         <a:spcAft>
           <a:spcPct val="0"/>
         </a:spcAft>
-        <a:defRPr sz="20161">
+        <a:defRPr sz="20163">
           <a:solidFill>
             <a:schemeClr val="tx2"/>
           </a:solidFill>
@@ -3940,14 +3940,14 @@
           <a:cs typeface="ＭＳ Ｐゴシック" pitchFamily="-65" charset="-128"/>
         </a:defRPr>
       </a:lvl1pPr>
-      <a:lvl2pPr algn="ctr" defTabSz="4191661" rtl="0" eaLnBrk="0" fontAlgn="base" hangingPunct="0">
+      <a:lvl2pPr algn="ctr" defTabSz="4192060" rtl="0" eaLnBrk="0" fontAlgn="base" hangingPunct="0">
         <a:spcBef>
           <a:spcPct val="0"/>
         </a:spcBef>
         <a:spcAft>
           <a:spcPct val="0"/>
         </a:spcAft>
-        <a:defRPr sz="20161">
+        <a:defRPr sz="20163">
           <a:solidFill>
             <a:schemeClr val="tx2"/>
           </a:solidFill>
@@ -3956,14 +3956,14 @@
           <a:cs typeface="ＭＳ Ｐゴシック" pitchFamily="-65" charset="-128"/>
         </a:defRPr>
       </a:lvl2pPr>
-      <a:lvl3pPr algn="ctr" defTabSz="4191661" rtl="0" eaLnBrk="0" fontAlgn="base" hangingPunct="0">
+      <a:lvl3pPr algn="ctr" defTabSz="4192060" rtl="0" eaLnBrk="0" fontAlgn="base" hangingPunct="0">
         <a:spcBef>
           <a:spcPct val="0"/>
         </a:spcBef>
         <a:spcAft>
           <a:spcPct val="0"/>
         </a:spcAft>
-        <a:defRPr sz="20161">
+        <a:defRPr sz="20163">
           <a:solidFill>
             <a:schemeClr val="tx2"/>
           </a:solidFill>
@@ -3972,14 +3972,14 @@
           <a:cs typeface="ＭＳ Ｐゴシック" pitchFamily="-65" charset="-128"/>
         </a:defRPr>
       </a:lvl3pPr>
-      <a:lvl4pPr algn="ctr" defTabSz="4191661" rtl="0" eaLnBrk="0" fontAlgn="base" hangingPunct="0">
+      <a:lvl4pPr algn="ctr" defTabSz="4192060" rtl="0" eaLnBrk="0" fontAlgn="base" hangingPunct="0">
         <a:spcBef>
           <a:spcPct val="0"/>
         </a:spcBef>
         <a:spcAft>
           <a:spcPct val="0"/>
         </a:spcAft>
-        <a:defRPr sz="20161">
+        <a:defRPr sz="20163">
           <a:solidFill>
             <a:schemeClr val="tx2"/>
           </a:solidFill>
@@ -3988,14 +3988,14 @@
           <a:cs typeface="ＭＳ Ｐゴシック" pitchFamily="-65" charset="-128"/>
         </a:defRPr>
       </a:lvl4pPr>
-      <a:lvl5pPr algn="ctr" defTabSz="4191661" rtl="0" eaLnBrk="0" fontAlgn="base" hangingPunct="0">
+      <a:lvl5pPr algn="ctr" defTabSz="4192060" rtl="0" eaLnBrk="0" fontAlgn="base" hangingPunct="0">
         <a:spcBef>
           <a:spcPct val="0"/>
         </a:spcBef>
         <a:spcAft>
           <a:spcPct val="0"/>
         </a:spcAft>
-        <a:defRPr sz="20161">
+        <a:defRPr sz="20163">
           <a:solidFill>
             <a:schemeClr val="tx2"/>
           </a:solidFill>
@@ -4004,56 +4004,56 @@
           <a:cs typeface="ＭＳ Ｐゴシック" pitchFamily="-65" charset="-128"/>
         </a:defRPr>
       </a:lvl5pPr>
-      <a:lvl6pPr marL="470276" algn="ctr" defTabSz="4191661" rtl="0" fontAlgn="base">
+      <a:lvl6pPr marL="470321" algn="ctr" defTabSz="4192060" rtl="0" fontAlgn="base">
         <a:spcBef>
           <a:spcPct val="0"/>
         </a:spcBef>
         <a:spcAft>
           <a:spcPct val="0"/>
         </a:spcAft>
-        <a:defRPr sz="20161">
+        <a:defRPr sz="20163">
           <a:solidFill>
             <a:schemeClr val="tx2"/>
           </a:solidFill>
           <a:latin typeface="Times New Roman" pitchFamily="-65" charset="0"/>
         </a:defRPr>
       </a:lvl6pPr>
-      <a:lvl7pPr marL="940552" algn="ctr" defTabSz="4191661" rtl="0" fontAlgn="base">
+      <a:lvl7pPr marL="940642" algn="ctr" defTabSz="4192060" rtl="0" fontAlgn="base">
         <a:spcBef>
           <a:spcPct val="0"/>
         </a:spcBef>
         <a:spcAft>
           <a:spcPct val="0"/>
         </a:spcAft>
-        <a:defRPr sz="20161">
+        <a:defRPr sz="20163">
           <a:solidFill>
             <a:schemeClr val="tx2"/>
           </a:solidFill>
           <a:latin typeface="Times New Roman" pitchFamily="-65" charset="0"/>
         </a:defRPr>
       </a:lvl7pPr>
-      <a:lvl8pPr marL="1410828" algn="ctr" defTabSz="4191661" rtl="0" fontAlgn="base">
+      <a:lvl8pPr marL="1410962" algn="ctr" defTabSz="4192060" rtl="0" fontAlgn="base">
         <a:spcBef>
           <a:spcPct val="0"/>
         </a:spcBef>
         <a:spcAft>
           <a:spcPct val="0"/>
         </a:spcAft>
-        <a:defRPr sz="20161">
+        <a:defRPr sz="20163">
           <a:solidFill>
             <a:schemeClr val="tx2"/>
           </a:solidFill>
           <a:latin typeface="Times New Roman" pitchFamily="-65" charset="0"/>
         </a:defRPr>
       </a:lvl8pPr>
-      <a:lvl9pPr marL="1881104" algn="ctr" defTabSz="4191661" rtl="0" fontAlgn="base">
+      <a:lvl9pPr marL="1881283" algn="ctr" defTabSz="4192060" rtl="0" fontAlgn="base">
         <a:spcBef>
           <a:spcPct val="0"/>
         </a:spcBef>
         <a:spcAft>
           <a:spcPct val="0"/>
         </a:spcAft>
-        <a:defRPr sz="20161">
+        <a:defRPr sz="20163">
           <a:solidFill>
             <a:schemeClr val="tx2"/>
           </a:solidFill>
@@ -4062,7 +4062,7 @@
       </a:lvl9pPr>
     </p:titleStyle>
     <p:bodyStyle>
-      <a:lvl1pPr marL="1572486" indent="-1572486" algn="l" defTabSz="4191661" rtl="0" eaLnBrk="0" fontAlgn="base" hangingPunct="0">
+      <a:lvl1pPr marL="1572636" indent="-1572636" algn="l" defTabSz="4192060" rtl="0" eaLnBrk="0" fontAlgn="base" hangingPunct="0">
         <a:spcBef>
           <a:spcPct val="20000"/>
         </a:spcBef>
@@ -4070,7 +4070,7 @@
           <a:spcPct val="0"/>
         </a:spcAft>
         <a:buChar char="•"/>
-        <a:defRPr sz="14709">
+        <a:defRPr sz="14710">
           <a:solidFill>
             <a:schemeClr val="tx1"/>
           </a:solidFill>
@@ -4079,7 +4079,7 @@
           <a:cs typeface="ＭＳ Ｐゴシック" pitchFamily="-65" charset="-128"/>
         </a:defRPr>
       </a:lvl1pPr>
-      <a:lvl2pPr marL="3406235" indent="-1309588" algn="l" defTabSz="4191661" rtl="0" eaLnBrk="0" fontAlgn="base" hangingPunct="0">
+      <a:lvl2pPr marL="3406559" indent="-1309713" algn="l" defTabSz="4192060" rtl="0" eaLnBrk="0" fontAlgn="base" hangingPunct="0">
         <a:spcBef>
           <a:spcPct val="20000"/>
         </a:spcBef>
@@ -4087,7 +4087,7 @@
           <a:spcPct val="0"/>
         </a:spcAft>
         <a:buChar char="–"/>
-        <a:defRPr sz="12857">
+        <a:defRPr sz="12858">
           <a:solidFill>
             <a:schemeClr val="tx1"/>
           </a:solidFill>
@@ -4095,7 +4095,7 @@
           <a:ea typeface="MS PGothic" panose="020B0600070205080204" pitchFamily="34" charset="-128"/>
         </a:defRPr>
       </a:lvl2pPr>
-      <a:lvl3pPr marL="5239985" indent="-1048323" algn="l" defTabSz="4191661" rtl="0" eaLnBrk="0" fontAlgn="base" hangingPunct="0">
+      <a:lvl3pPr marL="5240484" indent="-1048423" algn="l" defTabSz="4192060" rtl="0" eaLnBrk="0" fontAlgn="base" hangingPunct="0">
         <a:spcBef>
           <a:spcPct val="20000"/>
         </a:spcBef>
@@ -4103,7 +4103,7 @@
           <a:spcPct val="0"/>
         </a:spcAft>
         <a:buChar char="•"/>
-        <a:defRPr sz="11006">
+        <a:defRPr sz="11007">
           <a:solidFill>
             <a:schemeClr val="tx1"/>
           </a:solidFill>
@@ -4111,7 +4111,7 @@
           <a:ea typeface="MS PGothic" panose="020B0600070205080204" pitchFamily="34" charset="-128"/>
         </a:defRPr>
       </a:lvl3pPr>
-      <a:lvl4pPr marL="7336631" indent="-1048323" algn="l" defTabSz="4191661" rtl="0" eaLnBrk="0" fontAlgn="base" hangingPunct="0">
+      <a:lvl4pPr marL="7337330" indent="-1048423" algn="l" defTabSz="4192060" rtl="0" eaLnBrk="0" fontAlgn="base" hangingPunct="0">
         <a:spcBef>
           <a:spcPct val="20000"/>
         </a:spcBef>
@@ -4119,7 +4119,7 @@
           <a:spcPct val="0"/>
         </a:spcAft>
         <a:buChar char="–"/>
-        <a:defRPr sz="9155">
+        <a:defRPr sz="9156">
           <a:solidFill>
             <a:schemeClr val="tx1"/>
           </a:solidFill>
@@ -4127,7 +4127,7 @@
           <a:ea typeface="MS PGothic" panose="020B0600070205080204" pitchFamily="34" charset="-128"/>
         </a:defRPr>
       </a:lvl4pPr>
-      <a:lvl5pPr marL="9431645" indent="-1046691" algn="l" defTabSz="4191661" rtl="0" eaLnBrk="0" fontAlgn="base" hangingPunct="0">
+      <a:lvl5pPr marL="9432543" indent="-1046791" algn="l" defTabSz="4192060" rtl="0" eaLnBrk="0" fontAlgn="base" hangingPunct="0">
         <a:spcBef>
           <a:spcPct val="20000"/>
         </a:spcBef>
@@ -4135,7 +4135,7 @@
           <a:spcPct val="0"/>
         </a:spcAft>
         <a:buChar char="»"/>
-        <a:defRPr sz="9155">
+        <a:defRPr sz="9156">
           <a:solidFill>
             <a:schemeClr val="tx1"/>
           </a:solidFill>
@@ -4143,7 +4143,7 @@
           <a:ea typeface="MS PGothic" panose="020B0600070205080204" pitchFamily="34" charset="-128"/>
         </a:defRPr>
       </a:lvl5pPr>
-      <a:lvl6pPr marL="9901921" indent="-1046691" algn="l" defTabSz="4191661" rtl="0" fontAlgn="base">
+      <a:lvl6pPr marL="9902864" indent="-1046791" algn="l" defTabSz="4192060" rtl="0" fontAlgn="base">
         <a:spcBef>
           <a:spcPct val="20000"/>
         </a:spcBef>
@@ -4151,7 +4151,7 @@
           <a:spcPct val="0"/>
         </a:spcAft>
         <a:buChar char="»"/>
-        <a:defRPr sz="9155">
+        <a:defRPr sz="9156">
           <a:solidFill>
             <a:schemeClr val="tx1"/>
           </a:solidFill>
@@ -4159,7 +4159,7 @@
           <a:ea typeface="ＭＳ Ｐゴシック" pitchFamily="-65" charset="-128"/>
         </a:defRPr>
       </a:lvl6pPr>
-      <a:lvl7pPr marL="10372197" indent="-1046691" algn="l" defTabSz="4191661" rtl="0" fontAlgn="base">
+      <a:lvl7pPr marL="10373185" indent="-1046791" algn="l" defTabSz="4192060" rtl="0" fontAlgn="base">
         <a:spcBef>
           <a:spcPct val="20000"/>
         </a:spcBef>
@@ -4167,7 +4167,7 @@
           <a:spcPct val="0"/>
         </a:spcAft>
         <a:buChar char="»"/>
-        <a:defRPr sz="9155">
+        <a:defRPr sz="9156">
           <a:solidFill>
             <a:schemeClr val="tx1"/>
           </a:solidFill>
@@ -4175,7 +4175,7 @@
           <a:ea typeface="ＭＳ Ｐゴシック" pitchFamily="-65" charset="-128"/>
         </a:defRPr>
       </a:lvl7pPr>
-      <a:lvl8pPr marL="10842473" indent="-1046691" algn="l" defTabSz="4191661" rtl="0" fontAlgn="base">
+      <a:lvl8pPr marL="10843506" indent="-1046791" algn="l" defTabSz="4192060" rtl="0" fontAlgn="base">
         <a:spcBef>
           <a:spcPct val="20000"/>
         </a:spcBef>
@@ -4183,7 +4183,7 @@
           <a:spcPct val="0"/>
         </a:spcAft>
         <a:buChar char="»"/>
-        <a:defRPr sz="9155">
+        <a:defRPr sz="9156">
           <a:solidFill>
             <a:schemeClr val="tx1"/>
           </a:solidFill>
@@ -4191,7 +4191,7 @@
           <a:ea typeface="ＭＳ Ｐゴシック" pitchFamily="-65" charset="-128"/>
         </a:defRPr>
       </a:lvl8pPr>
-      <a:lvl9pPr marL="11312749" indent="-1046691" algn="l" defTabSz="4191661" rtl="0" fontAlgn="base">
+      <a:lvl9pPr marL="11313826" indent="-1046791" algn="l" defTabSz="4192060" rtl="0" fontAlgn="base">
         <a:spcBef>
           <a:spcPct val="20000"/>
         </a:spcBef>
@@ -4199,7 +4199,7 @@
           <a:spcPct val="0"/>
         </a:spcAft>
         <a:buChar char="»"/>
-        <a:defRPr sz="9155">
+        <a:defRPr sz="9156">
           <a:solidFill>
             <a:schemeClr val="tx1"/>
           </a:solidFill>
@@ -4212,7 +4212,7 @@
       <a:defPPr>
         <a:defRPr lang="en-US"/>
       </a:defPPr>
-      <a:lvl1pPr marL="0" algn="l" defTabSz="470276" rtl="0" eaLnBrk="1" latinLnBrk="0" hangingPunct="1">
+      <a:lvl1pPr marL="0" algn="l" defTabSz="470321" rtl="0" eaLnBrk="1" latinLnBrk="0" hangingPunct="1">
         <a:defRPr sz="1851" kern="1200">
           <a:solidFill>
             <a:schemeClr val="tx1"/>
@@ -4222,7 +4222,7 @@
           <a:cs typeface="+mn-cs"/>
         </a:defRPr>
       </a:lvl1pPr>
-      <a:lvl2pPr marL="470276" algn="l" defTabSz="470276" rtl="0" eaLnBrk="1" latinLnBrk="0" hangingPunct="1">
+      <a:lvl2pPr marL="470321" algn="l" defTabSz="470321" rtl="0" eaLnBrk="1" latinLnBrk="0" hangingPunct="1">
         <a:defRPr sz="1851" kern="1200">
           <a:solidFill>
             <a:schemeClr val="tx1"/>
@@ -4232,7 +4232,7 @@
           <a:cs typeface="+mn-cs"/>
         </a:defRPr>
       </a:lvl2pPr>
-      <a:lvl3pPr marL="940552" algn="l" defTabSz="470276" rtl="0" eaLnBrk="1" latinLnBrk="0" hangingPunct="1">
+      <a:lvl3pPr marL="940642" algn="l" defTabSz="470321" rtl="0" eaLnBrk="1" latinLnBrk="0" hangingPunct="1">
         <a:defRPr sz="1851" kern="1200">
           <a:solidFill>
             <a:schemeClr val="tx1"/>
@@ -4242,7 +4242,7 @@
           <a:cs typeface="+mn-cs"/>
         </a:defRPr>
       </a:lvl3pPr>
-      <a:lvl4pPr marL="1410828" algn="l" defTabSz="470276" rtl="0" eaLnBrk="1" latinLnBrk="0" hangingPunct="1">
+      <a:lvl4pPr marL="1410962" algn="l" defTabSz="470321" rtl="0" eaLnBrk="1" latinLnBrk="0" hangingPunct="1">
         <a:defRPr sz="1851" kern="1200">
           <a:solidFill>
             <a:schemeClr val="tx1"/>
@@ -4252,7 +4252,7 @@
           <a:cs typeface="+mn-cs"/>
         </a:defRPr>
       </a:lvl4pPr>
-      <a:lvl5pPr marL="1881104" algn="l" defTabSz="470276" rtl="0" eaLnBrk="1" latinLnBrk="0" hangingPunct="1">
+      <a:lvl5pPr marL="1881283" algn="l" defTabSz="470321" rtl="0" eaLnBrk="1" latinLnBrk="0" hangingPunct="1">
         <a:defRPr sz="1851" kern="1200">
           <a:solidFill>
             <a:schemeClr val="tx1"/>
@@ -4262,7 +4262,7 @@
           <a:cs typeface="+mn-cs"/>
         </a:defRPr>
       </a:lvl5pPr>
-      <a:lvl6pPr marL="2351380" algn="l" defTabSz="470276" rtl="0" eaLnBrk="1" latinLnBrk="0" hangingPunct="1">
+      <a:lvl6pPr marL="2351604" algn="l" defTabSz="470321" rtl="0" eaLnBrk="1" latinLnBrk="0" hangingPunct="1">
         <a:defRPr sz="1851" kern="1200">
           <a:solidFill>
             <a:schemeClr val="tx1"/>
@@ -4272,7 +4272,7 @@
           <a:cs typeface="+mn-cs"/>
         </a:defRPr>
       </a:lvl6pPr>
-      <a:lvl7pPr marL="2821656" algn="l" defTabSz="470276" rtl="0" eaLnBrk="1" latinLnBrk="0" hangingPunct="1">
+      <a:lvl7pPr marL="2821925" algn="l" defTabSz="470321" rtl="0" eaLnBrk="1" latinLnBrk="0" hangingPunct="1">
         <a:defRPr sz="1851" kern="1200">
           <a:solidFill>
             <a:schemeClr val="tx1"/>
@@ -4282,7 +4282,7 @@
           <a:cs typeface="+mn-cs"/>
         </a:defRPr>
       </a:lvl7pPr>
-      <a:lvl8pPr marL="3291931" algn="l" defTabSz="470276" rtl="0" eaLnBrk="1" latinLnBrk="0" hangingPunct="1">
+      <a:lvl8pPr marL="3292245" algn="l" defTabSz="470321" rtl="0" eaLnBrk="1" latinLnBrk="0" hangingPunct="1">
         <a:defRPr sz="1851" kern="1200">
           <a:solidFill>
             <a:schemeClr val="tx1"/>
@@ -4292,7 +4292,7 @@
           <a:cs typeface="+mn-cs"/>
         </a:defRPr>
       </a:lvl8pPr>
-      <a:lvl9pPr marL="3762207" algn="l" defTabSz="470276" rtl="0" eaLnBrk="1" latinLnBrk="0" hangingPunct="1">
+      <a:lvl9pPr marL="3762565" algn="l" defTabSz="470321" rtl="0" eaLnBrk="1" latinLnBrk="0" hangingPunct="1">
         <a:defRPr sz="1851" kern="1200">
           <a:solidFill>
             <a:schemeClr val="tx1"/>
@@ -4828,7 +4828,7 @@
               <a:buNone/>
             </a:pPr>
             <a:r>
-              <a:rPr lang="en-US" altLang="en-US" sz="4526" b="1" dirty="0">
+              <a:rPr lang="en-US" altLang="en-US" sz="4527" b="1" dirty="0">
                 <a:solidFill>
                   <a:srgbClr val="000000"/>
                 </a:solidFill>
@@ -4846,7 +4846,7 @@
               <a:buFontTx/>
               <a:buNone/>
             </a:pPr>
-            <a:endParaRPr lang="en-US" altLang="en-US" sz="4526" b="1" dirty="0">
+            <a:endParaRPr lang="en-US" altLang="en-US" sz="4527" b="1" dirty="0">
               <a:solidFill>
                 <a:srgbClr val="000000"/>
               </a:solidFill>
@@ -4863,7 +4863,7 @@
               <a:buNone/>
             </a:pPr>
             <a:r>
-              <a:rPr lang="en-US" altLang="en-US" sz="4526" b="1" dirty="0">
+              <a:rPr lang="en-US" altLang="en-US" sz="4527" b="1" dirty="0">
                 <a:solidFill>
                   <a:srgbClr val="000000"/>
                 </a:solidFill>
@@ -5063,7 +5063,7 @@
               <a:buNone/>
             </a:pPr>
             <a:r>
-              <a:rPr lang="en-US" altLang="en-US" sz="4526" b="1" dirty="0">
+              <a:rPr lang="en-US" altLang="en-US" sz="4527" b="1" dirty="0">
                 <a:solidFill>
                   <a:srgbClr val="000000"/>
                 </a:solidFill>
@@ -5111,8 +5111,8 @@
         </p:nvSpPr>
         <p:spPr bwMode="auto">
           <a:xfrm>
-            <a:off x="13309600" y="7106194"/>
-            <a:ext cx="24699877" cy="13299364"/>
+            <a:off x="13309601" y="7106195"/>
+            <a:ext cx="24699877" cy="14887532"/>
           </a:xfrm>
           <a:prstGeom prst="rect">
             <a:avLst/>
@@ -5337,8 +5337,8 @@
         </p:nvSpPr>
         <p:spPr bwMode="auto">
           <a:xfrm>
-            <a:off x="39312668" y="7047411"/>
-            <a:ext cx="10812780" cy="19614567"/>
+            <a:off x="39312668" y="7047412"/>
+            <a:ext cx="10812780" cy="14402732"/>
           </a:xfrm>
           <a:prstGeom prst="rect">
             <a:avLst/>
@@ -5524,7 +5524,7 @@
               <a:buNone/>
             </a:pPr>
             <a:r>
-              <a:rPr lang="en-US" altLang="en-US" sz="4526" b="1" dirty="0">
+              <a:rPr lang="en-US" altLang="en-US" sz="4527" b="1" dirty="0">
                 <a:solidFill>
                   <a:srgbClr val="000000"/>
                 </a:solidFill>
@@ -5556,7 +5556,7 @@
         </p:nvSpPr>
         <p:spPr bwMode="auto">
           <a:xfrm>
-            <a:off x="1062991" y="4587788"/>
+            <a:off x="1061357" y="3649141"/>
             <a:ext cx="49064091" cy="1519639"/>
           </a:xfrm>
           <a:prstGeom prst="rect">
@@ -5769,7 +5769,7 @@
         </p:nvSpPr>
         <p:spPr bwMode="auto">
           <a:xfrm>
-            <a:off x="13309600" y="27158703"/>
+            <a:off x="13309601" y="27158703"/>
             <a:ext cx="24699877" cy="4990499"/>
           </a:xfrm>
           <a:prstGeom prst="rect">
@@ -5792,14 +5792,14 @@
           <a:bodyPr lIns="940526" tIns="470263" rIns="940526" bIns="940526" numCol="2" spcCol="914400"/>
           <a:lstStyle/>
           <a:p>
-            <a:pPr marL="514365" indent="-514365" eaLnBrk="1" hangingPunct="1">
+            <a:pPr marL="514414" indent="-514414" eaLnBrk="1" hangingPunct="1">
               <a:spcBef>
                 <a:spcPct val="50000"/>
               </a:spcBef>
               <a:defRPr/>
             </a:pPr>
             <a:r>
-              <a:rPr lang="en-US" sz="4526" b="1" dirty="0">
+              <a:rPr lang="en-US" sz="4527" b="1" dirty="0">
                 <a:solidFill>
                   <a:srgbClr val="000000"/>
                 </a:solidFill>
@@ -5810,7 +5810,7 @@
             </a:r>
           </a:p>
           <a:p>
-            <a:pPr marL="514365" lvl="0" indent="-514365" eaLnBrk="1" hangingPunct="1">
+            <a:pPr marL="514414" indent="-514414" eaLnBrk="1" hangingPunct="1">
               <a:spcBef>
                 <a:spcPts val="1234"/>
               </a:spcBef>
@@ -5882,7 +5882,7 @@
             </a:endParaRPr>
           </a:p>
           <a:p>
-            <a:pPr marL="514365" lvl="0" indent="-514365" eaLnBrk="1" hangingPunct="1">
+            <a:pPr marL="514414" indent="-514414" eaLnBrk="1" hangingPunct="1">
               <a:spcBef>
                 <a:spcPts val="1234"/>
               </a:spcBef>
@@ -5898,7 +5898,7 @@
             </a:endParaRPr>
           </a:p>
           <a:p>
-            <a:pPr marL="514365" indent="-514365" eaLnBrk="1" hangingPunct="1">
+            <a:pPr marL="514414" indent="-514414" eaLnBrk="1" hangingPunct="1">
               <a:spcBef>
                 <a:spcPts val="1234"/>
               </a:spcBef>
@@ -5962,7 +5962,7 @@
             </a:r>
           </a:p>
           <a:p>
-            <a:pPr marL="514365" indent="-514365" eaLnBrk="1" hangingPunct="1">
+            <a:pPr marL="514414" indent="-514414" eaLnBrk="1" hangingPunct="1">
               <a:spcBef>
                 <a:spcPts val="1234"/>
               </a:spcBef>
@@ -5975,7 +5975,7 @@
             </a:endParaRPr>
           </a:p>
           <a:p>
-            <a:pPr marL="514365" indent="-514365" eaLnBrk="1" hangingPunct="1">
+            <a:pPr marL="514414" indent="-514414" eaLnBrk="1" hangingPunct="1">
               <a:spcBef>
                 <a:spcPts val="1234"/>
               </a:spcBef>
@@ -5988,7 +5988,7 @@
             </a:endParaRPr>
           </a:p>
           <a:p>
-            <a:pPr marL="514365" indent="-514365" eaLnBrk="1" hangingPunct="1">
+            <a:pPr marL="514414" indent="-514414" eaLnBrk="1" hangingPunct="1">
               <a:spcBef>
                 <a:spcPts val="1234"/>
               </a:spcBef>
@@ -6060,7 +6060,7 @@
             </a:r>
           </a:p>
           <a:p>
-            <a:pPr marL="514365" indent="-514365" eaLnBrk="1" hangingPunct="1">
+            <a:pPr marL="514414" indent="-514414" eaLnBrk="1" hangingPunct="1">
               <a:spcBef>
                 <a:spcPts val="1234"/>
               </a:spcBef>
@@ -6073,7 +6073,7 @@
             </a:endParaRPr>
           </a:p>
           <a:p>
-            <a:pPr marL="514365" indent="-514365" eaLnBrk="1" hangingPunct="1">
+            <a:pPr marL="514414" indent="-514414" eaLnBrk="1" hangingPunct="1">
               <a:defRPr/>
             </a:pPr>
             <a:r>
@@ -6158,7 +6158,7 @@
             </a:r>
           </a:p>
           <a:p>
-            <a:pPr marL="514365" indent="-514365" eaLnBrk="1" hangingPunct="1">
+            <a:pPr marL="514414" indent="-514414" eaLnBrk="1" hangingPunct="1">
               <a:defRPr/>
             </a:pPr>
             <a:endParaRPr lang="en-US" sz="2880" dirty="0">
@@ -6168,7 +6168,7 @@
             </a:endParaRPr>
           </a:p>
           <a:p>
-            <a:pPr marL="514365" indent="-514365" eaLnBrk="1" hangingPunct="1">
+            <a:pPr marL="514414" indent="-514414" eaLnBrk="1" hangingPunct="1">
               <a:defRPr/>
             </a:pPr>
             <a:r>
@@ -6245,7 +6245,7 @@
             </a:r>
           </a:p>
           <a:p>
-            <a:pPr marL="514365" indent="-514365" eaLnBrk="1" hangingPunct="1">
+            <a:pPr marL="514414" indent="-514414" eaLnBrk="1" hangingPunct="1">
               <a:defRPr/>
             </a:pPr>
             <a:endParaRPr lang="en-US" sz="2880" dirty="0">
@@ -6255,7 +6255,7 @@
             </a:endParaRPr>
           </a:p>
           <a:p>
-            <a:pPr marL="514365" indent="-514365" eaLnBrk="1" hangingPunct="1">
+            <a:pPr marL="514414" indent="-514414" eaLnBrk="1" hangingPunct="1">
               <a:spcBef>
                 <a:spcPct val="10000"/>
               </a:spcBef>
@@ -6279,8 +6279,8 @@
         </p:nvSpPr>
         <p:spPr bwMode="auto">
           <a:xfrm>
-            <a:off x="191045" y="1281854"/>
-            <a:ext cx="50863500" cy="1833579"/>
+            <a:off x="191045" y="1281791"/>
+            <a:ext cx="50863500" cy="1833707"/>
           </a:xfrm>
           <a:prstGeom prst="rect">
             <a:avLst/>
@@ -6304,7 +6304,7 @@
               <a:defRPr/>
             </a:pPr>
             <a:r>
-              <a:rPr lang="en-US" sz="11315" b="1" dirty="0">
+              <a:rPr lang="en-US" sz="11316" b="1" dirty="0">
                 <a:ln>
                   <a:solidFill>
                     <a:schemeClr val="bg1"/>
@@ -6316,7 +6316,7 @@
               <a:t>Stern-</a:t>
             </a:r>
             <a:r>
-              <a:rPr lang="en-US" sz="11315" b="1" dirty="0" err="1">
+              <a:rPr lang="en-US" sz="11316" b="1" dirty="0" err="1">
                 <a:ln>
                   <a:solidFill>
                     <a:schemeClr val="bg1"/>
@@ -6328,7 +6328,7 @@
               <a:t>Gerlach</a:t>
             </a:r>
             <a:r>
-              <a:rPr lang="en-US" sz="11315" b="1" dirty="0">
+              <a:rPr lang="en-US" sz="11316" b="1" dirty="0">
                 <a:ln>
                   <a:solidFill>
                     <a:schemeClr val="bg1"/>
@@ -6398,8 +6398,8 @@
         </p:nvSpPr>
         <p:spPr bwMode="auto">
           <a:xfrm>
-            <a:off x="13309600" y="20902283"/>
-            <a:ext cx="24699877" cy="5759695"/>
+            <a:off x="13309600" y="22186232"/>
+            <a:ext cx="37047714" cy="4475746"/>
           </a:xfrm>
           <a:prstGeom prst="rect">
             <a:avLst/>
@@ -6585,14 +6585,14 @@
               <a:buNone/>
             </a:pPr>
             <a:r>
-              <a:rPr lang="en-US" altLang="en-US" sz="4526" b="1" dirty="0">
+              <a:rPr lang="en-US" altLang="en-US" sz="4527" b="1" dirty="0">
                 <a:solidFill>
                   <a:srgbClr val="000000"/>
                 </a:solidFill>
                 <a:latin typeface="Helvetica" panose="020B0604020202020204" pitchFamily="34" charset="0"/>
                 <a:cs typeface="Helvetica" panose="020B0604020202020204" pitchFamily="34" charset="0"/>
               </a:rPr>
-              <a:t>Materials and methods</a:t>
+              <a:t>Methods</a:t>
             </a:r>
             <a:r>
               <a:rPr lang="en-US" altLang="en-US" sz="2469" dirty="0">
@@ -6612,10 +6612,7 @@
               <a:buFontTx/>
               <a:buNone/>
             </a:pPr>
-            <a:r>
-              <a:rPr lang="en-US" altLang="en-US" sz="2880" dirty="0"/>
-              <a:t>Blah, blah, blah</a:t>
-            </a:r>
+            <a:endParaRPr lang="en-US" altLang="en-US" sz="2880" dirty="0"/>
           </a:p>
           <a:p>
             <a:pPr eaLnBrk="1" hangingPunct="1">
@@ -6640,7 +6637,7 @@
             <p:spPr>
               <a:xfrm>
                 <a:off x="1642484" y="18099646"/>
-                <a:ext cx="10439026" cy="15708467"/>
+                <a:ext cx="10439026" cy="15216025"/>
               </a:xfrm>
               <a:prstGeom prst="rect">
                 <a:avLst/>
@@ -7027,8 +7024,10 @@
                             <m:t>𝜕</m:t>
                           </m:r>
                           <m:r>
-                            <a:rPr lang="en-US" i="1"/>
-                            <m:t>𝑥</m:t>
+                            <a:rPr lang="en-US" i="1">
+                              <a:latin typeface="Cambria Math" panose="02040503050406030204" pitchFamily="18" charset="0"/>
+                            </a:rPr>
+                            <m:t>𝑡</m:t>
                           </m:r>
                         </m:den>
                       </m:f>
@@ -8040,7 +8039,7 @@
             <p:spPr>
               <a:xfrm>
                 <a:off x="1642484" y="18099646"/>
-                <a:ext cx="10439026" cy="15708467"/>
+                <a:ext cx="10439026" cy="15216025"/>
               </a:xfrm>
               <a:prstGeom prst="rect">
                 <a:avLst/>
@@ -8048,7 +8047,7 @@
               <a:blipFill>
                 <a:blip r:embed="rId5"/>
                 <a:stretch>
-                  <a:fillRect l="-1459" t="-504"/>
+                  <a:fillRect l="-1459" t="-521"/>
                 </a:stretch>
               </a:blipFill>
             </p:spPr>
@@ -8067,6 +8066,32 @@
           </p:sp>
         </mc:Fallback>
       </mc:AlternateContent>
+      <p:sp>
+        <p:nvSpPr>
+          <p:cNvPr id="4" name="TextBox 3"/>
+          <p:cNvSpPr txBox="1"/>
+          <p:nvPr/>
+        </p:nvSpPr>
+        <p:spPr>
+          <a:xfrm>
+            <a:off x="16747959" y="23846590"/>
+            <a:ext cx="184731" cy="584775"/>
+          </a:xfrm>
+          <a:prstGeom prst="rect">
+            <a:avLst/>
+          </a:prstGeom>
+          <a:noFill/>
+        </p:spPr>
+        <p:txBody>
+          <a:bodyPr wrap="none" rtlCol="0">
+            <a:spAutoFit/>
+          </a:bodyPr>
+          <a:lstStyle/>
+          <a:p>
+            <a:endParaRPr lang="en-US" dirty="0"/>
+          </a:p>
+        </p:txBody>
+      </p:sp>
     </p:spTree>
   </p:cSld>
   <p:clrMapOvr>

</xml_diff>